<commit_message>
the final version of ppt
</commit_message>
<xml_diff>
--- a/TIC_PP.pptx
+++ b/TIC_PP.pptx
@@ -138,7 +138,7 @@
   <pc:docChgLst>
     <pc:chgData name="Chahinez Yahiaoui" userId="60bbd5248aadbc6a" providerId="LiveId" clId="{755EDBCF-F2E2-4603-A54C-DE63A909D963}"/>
     <pc:docChg chg="undo redo custSel addSld delSld modSld sldOrd">
-      <pc:chgData name="Chahinez Yahiaoui" userId="60bbd5248aadbc6a" providerId="LiveId" clId="{755EDBCF-F2E2-4603-A54C-DE63A909D963}" dt="2024-01-05T02:10:26.262" v="6800" actId="1076"/>
+      <pc:chgData name="Chahinez Yahiaoui" userId="60bbd5248aadbc6a" providerId="LiveId" clId="{755EDBCF-F2E2-4603-A54C-DE63A909D963}" dt="2024-01-05T10:43:51.951" v="6803" actId="255"/>
       <pc:docMkLst>
         <pc:docMk/>
       </pc:docMkLst>
@@ -448,7 +448,7 @@
         </pc:picChg>
       </pc:sldChg>
       <pc:sldChg chg="addSp delSp modSp new mod modTransition">
-        <pc:chgData name="Chahinez Yahiaoui" userId="60bbd5248aadbc6a" providerId="LiveId" clId="{755EDBCF-F2E2-4603-A54C-DE63A909D963}" dt="2024-01-05T01:50:21.296" v="6719"/>
+        <pc:chgData name="Chahinez Yahiaoui" userId="60bbd5248aadbc6a" providerId="LiveId" clId="{755EDBCF-F2E2-4603-A54C-DE63A909D963}" dt="2024-01-05T10:43:09.118" v="6801" actId="255"/>
         <pc:sldMkLst>
           <pc:docMk/>
           <pc:sldMk cId="1064202949" sldId="263"/>
@@ -462,7 +462,7 @@
           </ac:spMkLst>
         </pc:spChg>
         <pc:spChg chg="add mod">
-          <ac:chgData name="Chahinez Yahiaoui" userId="60bbd5248aadbc6a" providerId="LiveId" clId="{755EDBCF-F2E2-4603-A54C-DE63A909D963}" dt="2024-01-05T00:38:01.071" v="6148" actId="207"/>
+          <ac:chgData name="Chahinez Yahiaoui" userId="60bbd5248aadbc6a" providerId="LiveId" clId="{755EDBCF-F2E2-4603-A54C-DE63A909D963}" dt="2024-01-05T10:43:09.118" v="6801" actId="255"/>
           <ac:spMkLst>
             <pc:docMk/>
             <pc:sldMk cId="1064202949" sldId="263"/>
@@ -1731,13 +1731,13 @@
         </pc:spChg>
       </pc:sldChg>
       <pc:sldChg chg="addSp modSp new mod modTransition modAnim">
-        <pc:chgData name="Chahinez Yahiaoui" userId="60bbd5248aadbc6a" providerId="LiveId" clId="{755EDBCF-F2E2-4603-A54C-DE63A909D963}" dt="2024-01-05T01:52:43.146" v="6727"/>
+        <pc:chgData name="Chahinez Yahiaoui" userId="60bbd5248aadbc6a" providerId="LiveId" clId="{755EDBCF-F2E2-4603-A54C-DE63A909D963}" dt="2024-01-05T10:43:40.396" v="6802" actId="255"/>
         <pc:sldMkLst>
           <pc:docMk/>
           <pc:sldMk cId="1324247123" sldId="273"/>
         </pc:sldMkLst>
         <pc:spChg chg="add mod">
-          <ac:chgData name="Chahinez Yahiaoui" userId="60bbd5248aadbc6a" providerId="LiveId" clId="{755EDBCF-F2E2-4603-A54C-DE63A909D963}" dt="2024-01-05T00:40:07.396" v="6164" actId="12"/>
+          <ac:chgData name="Chahinez Yahiaoui" userId="60bbd5248aadbc6a" providerId="LiveId" clId="{755EDBCF-F2E2-4603-A54C-DE63A909D963}" dt="2024-01-05T10:43:40.396" v="6802" actId="255"/>
           <ac:spMkLst>
             <pc:docMk/>
             <pc:sldMk cId="1324247123" sldId="273"/>
@@ -1761,13 +1761,13 @@
         </pc:spChg>
       </pc:sldChg>
       <pc:sldChg chg="addSp modSp new mod ord modTransition">
-        <pc:chgData name="Chahinez Yahiaoui" userId="60bbd5248aadbc6a" providerId="LiveId" clId="{755EDBCF-F2E2-4603-A54C-DE63A909D963}" dt="2024-01-05T01:52:28.891" v="6726"/>
+        <pc:chgData name="Chahinez Yahiaoui" userId="60bbd5248aadbc6a" providerId="LiveId" clId="{755EDBCF-F2E2-4603-A54C-DE63A909D963}" dt="2024-01-05T10:43:51.951" v="6803" actId="255"/>
         <pc:sldMkLst>
           <pc:docMk/>
           <pc:sldMk cId="125317397" sldId="275"/>
         </pc:sldMkLst>
         <pc:spChg chg="add mod">
-          <ac:chgData name="Chahinez Yahiaoui" userId="60bbd5248aadbc6a" providerId="LiveId" clId="{755EDBCF-F2E2-4603-A54C-DE63A909D963}" dt="2024-01-05T00:41:21.818" v="6173" actId="2711"/>
+          <ac:chgData name="Chahinez Yahiaoui" userId="60bbd5248aadbc6a" providerId="LiveId" clId="{755EDBCF-F2E2-4603-A54C-DE63A909D963}" dt="2024-01-05T10:43:51.951" v="6803" actId="255"/>
           <ac:spMkLst>
             <pc:docMk/>
             <pc:sldMk cId="125317397" sldId="275"/>
@@ -12231,7 +12231,7 @@
         <p:spPr>
           <a:xfrm>
             <a:off x="363557" y="296128"/>
-            <a:ext cx="8824511" cy="5856988"/>
+            <a:ext cx="8824511" cy="5927777"/>
           </a:xfrm>
           <a:prstGeom prst="rect">
             <a:avLst/>
@@ -12253,7 +12253,7 @@
               </a:spcBef>
             </a:pPr>
             <a:r>
-              <a:rPr lang="en-US" sz="2000" b="1" kern="0" dirty="0">
+              <a:rPr lang="en-US" sz="2400" b="1" kern="0" dirty="0">
                 <a:solidFill>
                   <a:schemeClr val="accent3">
                     <a:lumMod val="75000"/>
@@ -12266,7 +12266,7 @@
               </a:rPr>
               <a:t>The future of ICT:</a:t>
             </a:r>
-            <a:endParaRPr lang="fr-FR" sz="2000" b="1" dirty="0">
+            <a:endParaRPr lang="fr-FR" sz="2400" b="1" dirty="0">
               <a:solidFill>
                 <a:schemeClr val="accent3">
                   <a:lumMod val="75000"/>
@@ -13190,7 +13190,7 @@
         <p:spPr>
           <a:xfrm>
             <a:off x="264405" y="187287"/>
-            <a:ext cx="8967730" cy="5896166"/>
+            <a:ext cx="8967730" cy="6002349"/>
           </a:xfrm>
           <a:prstGeom prst="rect">
             <a:avLst/>
@@ -13212,7 +13212,7 @@
               </a:spcBef>
             </a:pPr>
             <a:r>
-              <a:rPr lang="en-US" sz="2000" b="1" kern="0" dirty="0">
+              <a:rPr lang="en-US" sz="2400" b="1" kern="0" dirty="0">
                 <a:solidFill>
                   <a:schemeClr val="accent3">
                     <a:lumMod val="75000"/>
@@ -13225,7 +13225,7 @@
               </a:rPr>
               <a:t>Conclusion:</a:t>
             </a:r>
-            <a:endParaRPr lang="fr-FR" sz="2000" dirty="0">
+            <a:endParaRPr lang="fr-FR" sz="2400" dirty="0">
               <a:solidFill>
                 <a:schemeClr val="accent3">
                   <a:lumMod val="75000"/>
@@ -16489,7 +16489,7 @@
               </a:spcBef>
             </a:pPr>
             <a:r>
-              <a:rPr lang="en-US" sz="2000" b="1" kern="0" dirty="0">
+              <a:rPr lang="en-US" sz="2400" b="1" kern="0" dirty="0">
                 <a:solidFill>
                   <a:schemeClr val="accent3">
                     <a:lumMod val="75000"/>
@@ -16502,7 +16502,7 @@
               </a:rPr>
               <a:t>The Impact of ICT:</a:t>
             </a:r>
-            <a:endParaRPr lang="fr-FR" sz="2000" b="1" dirty="0">
+            <a:endParaRPr lang="fr-FR" sz="2400" b="1" dirty="0">
               <a:solidFill>
                 <a:schemeClr val="accent3">
                   <a:lumMod val="75000"/>

</xml_diff>

<commit_message>
edits to power point
</commit_message>
<xml_diff>
--- a/TIC_PP.pptx
+++ b/TIC_PP.pptx
@@ -8215,15 +8215,15 @@
         </p:nvSpPr>
         <p:spPr>
           <a:xfrm>
-            <a:off x="2815750" y="2572158"/>
-            <a:ext cx="6560500" cy="1480457"/>
+            <a:off x="2491274" y="2099389"/>
+            <a:ext cx="8924886" cy="1856754"/>
           </a:xfrm>
         </p:spPr>
         <p:txBody>
           <a:bodyPr/>
           <a:lstStyle/>
           <a:p>
-            <a:pPr>
+            <a:pPr algn="ctr">
               <a:lnSpc>
                 <a:spcPct val="115000"/>
               </a:lnSpc>
@@ -8232,7 +8232,7 @@
               </a:spcAft>
             </a:pPr>
             <a:r>
-              <a:rPr lang="en-US" sz="3200" b="1" dirty="0">
+              <a:rPr lang="en-US" sz="3000" b="1" dirty="0">
                 <a:solidFill>
                   <a:schemeClr val="accent2">
                     <a:lumMod val="60000"/>
@@ -8253,7 +8253,7 @@
               <a:t>Final Project of TIC </a:t>
             </a:r>
             <a:br>
-              <a:rPr lang="fr-FR" sz="3200" b="1" dirty="0">
+              <a:rPr lang="fr-FR" sz="3000" b="1" dirty="0">
                 <a:solidFill>
                   <a:schemeClr val="accent2">
                     <a:lumMod val="60000"/>
@@ -8273,7 +8273,7 @@
               </a:rPr>
             </a:br>
             <a:r>
-              <a:rPr lang="en-US" sz="3200" b="1" dirty="0">
+              <a:rPr lang="en-US" sz="3000" b="1" dirty="0">
                 <a:solidFill>
                   <a:schemeClr val="accent2">
                     <a:lumMod val="60000"/>
@@ -8294,7 +8294,7 @@
               <a:t>Information and Communication Technologies ICT </a:t>
             </a:r>
             <a:br>
-              <a:rPr lang="fr-FR" sz="3200" b="1" dirty="0">
+              <a:rPr lang="en-US" sz="3000" b="1" dirty="0">
                 <a:solidFill>
                   <a:schemeClr val="accent2">
                     <a:lumMod val="60000"/>
@@ -8314,7 +8314,7 @@
               </a:rPr>
             </a:br>
             <a:r>
-              <a:rPr lang="en-US" sz="3200" b="1" dirty="0">
+              <a:rPr lang="en-US" sz="3000" b="1" dirty="0">
                 <a:solidFill>
                   <a:schemeClr val="accent2">
                     <a:lumMod val="60000"/>
@@ -8334,7 +8334,7 @@
               </a:rPr>
               <a:t>&amp; Technologies related to ICT</a:t>
             </a:r>
-            <a:endParaRPr lang="fr-FR" sz="3200" b="1" dirty="0">
+            <a:endParaRPr lang="fr-FR" sz="3000" b="1" dirty="0">
               <a:solidFill>
                 <a:schemeClr val="accent2">
                   <a:lumMod val="60000"/>
@@ -8720,55 +8720,8 @@
         </p:blipFill>
         <p:spPr bwMode="auto">
           <a:xfrm>
-            <a:off x="1049990" y="211517"/>
+            <a:off x="1049990" y="174195"/>
             <a:ext cx="2363770" cy="2363770"/>
-          </a:xfrm>
-          <a:prstGeom prst="rect">
-            <a:avLst/>
-          </a:prstGeom>
-          <a:noFill/>
-          <a:extLst>
-            <a:ext uri="{909E8E84-426E-40DD-AFC4-6F175D3DCCD1}">
-              <a14:hiddenFill xmlns:a14="http://schemas.microsoft.com/office/drawing/2010/main">
-                <a:solidFill>
-                  <a:srgbClr val="FFFFFF"/>
-                </a:solidFill>
-              </a14:hiddenFill>
-            </a:ext>
-          </a:extLst>
-        </p:spPr>
-      </p:pic>
-      <p:pic>
-        <p:nvPicPr>
-          <p:cNvPr id="1036" name="Picture 12" descr="internet of things, internet, iot, wireless, mechanic, gear, settings ">
-            <a:extLst>
-              <a:ext uri="{FF2B5EF4-FFF2-40B4-BE49-F238E27FC236}">
-                <a16:creationId xmlns:a16="http://schemas.microsoft.com/office/drawing/2014/main" id="{FDA02079-ADDA-688A-4EE1-67173983FF91}"/>
-              </a:ext>
-            </a:extLst>
-          </p:cNvPr>
-          <p:cNvPicPr>
-            <a:picLocks noChangeAspect="1" noChangeArrowheads="1"/>
-          </p:cNvPicPr>
-          <p:nvPr/>
-        </p:nvPicPr>
-        <p:blipFill>
-          <a:blip r:embed="rId5">
-            <a:extLst>
-              <a:ext uri="{28A0092B-C50C-407E-A947-70E740481C1C}">
-                <a14:useLocalDpi xmlns:a14="http://schemas.microsoft.com/office/drawing/2010/main" val="0"/>
-              </a:ext>
-            </a:extLst>
-          </a:blip>
-          <a:srcRect/>
-          <a:stretch>
-            <a:fillRect/>
-          </a:stretch>
-        </p:blipFill>
-        <p:spPr bwMode="auto">
-          <a:xfrm>
-            <a:off x="9555480" y="30480"/>
-            <a:ext cx="2636520" cy="2636520"/>
           </a:xfrm>
           <a:prstGeom prst="rect">
             <a:avLst/>
@@ -17535,11 +17488,11 @@
   <p:clrMapOvr>
     <a:masterClrMapping/>
   </p:clrMapOvr>
-  <mc:AlternateContent xmlns:mc="http://schemas.openxmlformats.org/markup-compatibility/2006">
-    <mc:Choice xmlns:p14="http://schemas.microsoft.com/office/powerpoint/2010/main" Requires="p14">
+  <mc:AlternateContent xmlns:mc="http://schemas.openxmlformats.org/markup-compatibility/2006" xmlns:p14="http://schemas.microsoft.com/office/powerpoint/2010/main">
+    <mc:Choice Requires="p14">
       <p:transition spd="slow" p14:dur="1500"/>
     </mc:Choice>
-    <mc:Fallback>
+    <mc:Fallback xmlns="">
       <p:transition spd="slow"/>
     </mc:Fallback>
   </mc:AlternateContent>

</xml_diff>